<commit_message>
last commit before merge
</commit_message>
<xml_diff>
--- a/UI.pptx
+++ b/UI.pptx
@@ -259,7 +259,7 @@
           <a:p>
             <a:fld id="{E3D2B2B2-9209-4DDF-BC2E-A2563848F352}" type="datetimeFigureOut">
               <a:rPr lang="fr-FR" smtClean="0"/>
-              <a:t>19/11/2019</a:t>
+              <a:t>25/11/2019</a:t>
             </a:fld>
             <a:endParaRPr lang="fr-FR"/>
           </a:p>
@@ -457,7 +457,7 @@
           <a:p>
             <a:fld id="{E3D2B2B2-9209-4DDF-BC2E-A2563848F352}" type="datetimeFigureOut">
               <a:rPr lang="fr-FR" smtClean="0"/>
-              <a:t>19/11/2019</a:t>
+              <a:t>25/11/2019</a:t>
             </a:fld>
             <a:endParaRPr lang="fr-FR"/>
           </a:p>
@@ -665,7 +665,7 @@
           <a:p>
             <a:fld id="{E3D2B2B2-9209-4DDF-BC2E-A2563848F352}" type="datetimeFigureOut">
               <a:rPr lang="fr-FR" smtClean="0"/>
-              <a:t>19/11/2019</a:t>
+              <a:t>25/11/2019</a:t>
             </a:fld>
             <a:endParaRPr lang="fr-FR"/>
           </a:p>
@@ -863,7 +863,7 @@
           <a:p>
             <a:fld id="{E3D2B2B2-9209-4DDF-BC2E-A2563848F352}" type="datetimeFigureOut">
               <a:rPr lang="fr-FR" smtClean="0"/>
-              <a:t>19/11/2019</a:t>
+              <a:t>25/11/2019</a:t>
             </a:fld>
             <a:endParaRPr lang="fr-FR"/>
           </a:p>
@@ -1138,7 +1138,7 @@
           <a:p>
             <a:fld id="{E3D2B2B2-9209-4DDF-BC2E-A2563848F352}" type="datetimeFigureOut">
               <a:rPr lang="fr-FR" smtClean="0"/>
-              <a:t>19/11/2019</a:t>
+              <a:t>25/11/2019</a:t>
             </a:fld>
             <a:endParaRPr lang="fr-FR"/>
           </a:p>
@@ -1403,7 +1403,7 @@
           <a:p>
             <a:fld id="{E3D2B2B2-9209-4DDF-BC2E-A2563848F352}" type="datetimeFigureOut">
               <a:rPr lang="fr-FR" smtClean="0"/>
-              <a:t>19/11/2019</a:t>
+              <a:t>25/11/2019</a:t>
             </a:fld>
             <a:endParaRPr lang="fr-FR"/>
           </a:p>
@@ -1815,7 +1815,7 @@
           <a:p>
             <a:fld id="{E3D2B2B2-9209-4DDF-BC2E-A2563848F352}" type="datetimeFigureOut">
               <a:rPr lang="fr-FR" smtClean="0"/>
-              <a:t>19/11/2019</a:t>
+              <a:t>25/11/2019</a:t>
             </a:fld>
             <a:endParaRPr lang="fr-FR"/>
           </a:p>
@@ -1956,7 +1956,7 @@
           <a:p>
             <a:fld id="{E3D2B2B2-9209-4DDF-BC2E-A2563848F352}" type="datetimeFigureOut">
               <a:rPr lang="fr-FR" smtClean="0"/>
-              <a:t>19/11/2019</a:t>
+              <a:t>25/11/2019</a:t>
             </a:fld>
             <a:endParaRPr lang="fr-FR"/>
           </a:p>
@@ -2069,7 +2069,7 @@
           <a:p>
             <a:fld id="{E3D2B2B2-9209-4DDF-BC2E-A2563848F352}" type="datetimeFigureOut">
               <a:rPr lang="fr-FR" smtClean="0"/>
-              <a:t>19/11/2019</a:t>
+              <a:t>25/11/2019</a:t>
             </a:fld>
             <a:endParaRPr lang="fr-FR"/>
           </a:p>
@@ -2380,7 +2380,7 @@
           <a:p>
             <a:fld id="{E3D2B2B2-9209-4DDF-BC2E-A2563848F352}" type="datetimeFigureOut">
               <a:rPr lang="fr-FR" smtClean="0"/>
-              <a:t>19/11/2019</a:t>
+              <a:t>25/11/2019</a:t>
             </a:fld>
             <a:endParaRPr lang="fr-FR"/>
           </a:p>
@@ -2668,7 +2668,7 @@
           <a:p>
             <a:fld id="{E3D2B2B2-9209-4DDF-BC2E-A2563848F352}" type="datetimeFigureOut">
               <a:rPr lang="fr-FR" smtClean="0"/>
-              <a:t>19/11/2019</a:t>
+              <a:t>25/11/2019</a:t>
             </a:fld>
             <a:endParaRPr lang="fr-FR"/>
           </a:p>
@@ -2909,7 +2909,7 @@
           <a:p>
             <a:fld id="{E3D2B2B2-9209-4DDF-BC2E-A2563848F352}" type="datetimeFigureOut">
               <a:rPr lang="fr-FR" smtClean="0"/>
-              <a:t>19/11/2019</a:t>
+              <a:t>25/11/2019</a:t>
             </a:fld>
             <a:endParaRPr lang="fr-FR"/>
           </a:p>
@@ -3312,6 +3312,14 @@
 <file path=ppt/slides/slide1.xml><?xml version="1.0" encoding="utf-8"?>
 <p:sld xmlns:a="http://schemas.openxmlformats.org/drawingml/2006/main" xmlns:r="http://schemas.openxmlformats.org/officeDocument/2006/relationships" xmlns:p="http://schemas.openxmlformats.org/presentationml/2006/main">
   <p:cSld>
+    <p:bg>
+      <p:bgPr>
+        <a:solidFill>
+          <a:schemeClr val="bg1"/>
+        </a:solidFill>
+        <a:effectLst/>
+      </p:bgPr>
+    </p:bg>
     <p:spTree>
       <p:nvGrpSpPr>
         <p:cNvPr id="1" name=""/>
@@ -3326,60 +3334,6 @@
           <a:chExt cx="0" cy="0"/>
         </a:xfrm>
       </p:grpSpPr>
-      <p:sp>
-        <p:nvSpPr>
-          <p:cNvPr id="12" name="Rectangle 11">
-            <a:extLst>
-              <a:ext uri="{FF2B5EF4-FFF2-40B4-BE49-F238E27FC236}">
-                <a16:creationId xmlns:a16="http://schemas.microsoft.com/office/drawing/2014/main" id="{5F1563B9-5063-47D2-B5FA-D1187A76ED58}"/>
-              </a:ext>
-            </a:extLst>
-          </p:cNvPr>
-          <p:cNvSpPr/>
-          <p:nvPr/>
-        </p:nvSpPr>
-        <p:spPr>
-          <a:xfrm>
-            <a:off x="0" y="0"/>
-            <a:ext cx="12192000" cy="6858000"/>
-          </a:xfrm>
-          <a:prstGeom prst="rect">
-            <a:avLst/>
-          </a:prstGeom>
-          <a:solidFill>
-            <a:srgbClr val="252526">
-              <a:alpha val="20000"/>
-            </a:srgbClr>
-          </a:solidFill>
-          <a:ln>
-            <a:noFill/>
-          </a:ln>
-        </p:spPr>
-        <p:style>
-          <a:lnRef idx="2">
-            <a:schemeClr val="accent1">
-              <a:shade val="50000"/>
-            </a:schemeClr>
-          </a:lnRef>
-          <a:fillRef idx="1">
-            <a:schemeClr val="accent1"/>
-          </a:fillRef>
-          <a:effectRef idx="0">
-            <a:schemeClr val="accent1"/>
-          </a:effectRef>
-          <a:fontRef idx="minor">
-            <a:schemeClr val="lt1"/>
-          </a:fontRef>
-        </p:style>
-        <p:txBody>
-          <a:bodyPr rtlCol="0" anchor="ctr"/>
-          <a:lstStyle/>
-          <a:p>
-            <a:pPr algn="ctr"/>
-            <a:endParaRPr lang="fr-FR" dirty="0"/>
-          </a:p>
-        </p:txBody>
-      </p:sp>
       <p:sp>
         <p:nvSpPr>
           <p:cNvPr id="28" name="ZoneTexte 27">
@@ -3617,13 +3571,13 @@
         </p:nvPicPr>
         <p:blipFill rotWithShape="1">
           <a:blip r:embed="rId4"/>
-          <a:srcRect l="12353" t="46013" r="24926" b="46013"/>
+          <a:srcRect l="14338" t="50970" r="22941" b="8533"/>
           <a:stretch/>
         </p:blipFill>
         <p:spPr>
           <a:xfrm>
-            <a:off x="3606012" y="7071963"/>
-            <a:ext cx="7646894" cy="3021106"/>
+            <a:off x="2015684" y="3429000"/>
+            <a:ext cx="16330836" cy="6451925"/>
           </a:xfrm>
           <a:prstGeom prst="rect">
             <a:avLst/>
@@ -3649,14 +3603,16 @@
           </a:xfrm>
           <a:prstGeom prst="roundRect">
             <a:avLst>
-              <a:gd name="adj" fmla="val 0"/>
+              <a:gd name="adj" fmla="val 3185"/>
             </a:avLst>
           </a:prstGeom>
           <a:solidFill>
             <a:schemeClr val="bg1"/>
           </a:solidFill>
-          <a:ln>
-            <a:noFill/>
+          <a:ln w="25400">
+            <a:solidFill>
+              <a:srgbClr val="05F26C"/>
+            </a:solidFill>
           </a:ln>
           <a:effectLst>
             <a:outerShdw blurRad="63500" sx="102000" sy="102000" algn="ctr" rotWithShape="0">
@@ -4010,7 +3966,7 @@
             <a:r>
               <a:rPr lang="fr-FR" sz="1400" dirty="0">
                 <a:solidFill>
-                  <a:srgbClr val="05F26C"/>
+                  <a:srgbClr val="01400B"/>
                 </a:solidFill>
                 <a:latin typeface="Archive" panose="02000506040000020004" pitchFamily="50" charset="0"/>
               </a:rPr>

</xml_diff>